<commit_message>
Trab 1 feito, falta parte 2 trab 2
</commit_message>
<xml_diff>
--- a/Fuzzy/Trab2_Guindaste/1810764-guindaste/imagens.pptx
+++ b/Fuzzy/Trab2_Guindaste/1810764-guindaste/imagens.pptx
@@ -11,6 +11,8 @@
     <p:sldId id="259" r:id="rId5"/>
     <p:sldId id="260" r:id="rId6"/>
     <p:sldId id="261" r:id="rId7"/>
+    <p:sldId id="262" r:id="rId8"/>
+    <p:sldId id="263" r:id="rId9"/>
   </p:sldIdLst>
   <p:sldSz cx="12192000" cy="6858000"/>
   <p:notesSz cx="6858000" cy="9144000"/>
@@ -109,13 +111,18 @@
       </a:defRPr>
     </a:lvl9pPr>
   </p:defaultTextStyle>
+  <p:extLst>
+    <p:ext uri="{EFAFB233-063F-42B5-8137-9DF3F51BA10A}">
+      <p15:sldGuideLst xmlns:p15="http://schemas.microsoft.com/office/powerpoint/2012/main"/>
+    </p:ext>
+  </p:extLst>
 </p:presentation>
 </file>
 
 <file path=ppt/revisionInfo.xml><?xml version="1.0" encoding="utf-8"?>
 <p1510:revInfo xmlns:a="http://schemas.openxmlformats.org/drawingml/2006/main" xmlns:r="http://schemas.openxmlformats.org/officeDocument/2006/relationships" xmlns:p1510="http://schemas.microsoft.com/office/powerpoint/2015/10/main">
   <p1510:revLst>
-    <p1510:client id="{684ED9F6-A287-4658-AB68-B81D54743169}" v="6" dt="2021-06-24T01:17:11.248"/>
+    <p1510:client id="{684ED9F6-A287-4658-AB68-B81D54743169}" v="8" dt="2021-06-25T03:16:42.063"/>
   </p1510:revLst>
 </p1510:revInfo>
 </file>
@@ -124,8 +131,8 @@
 <pc:chgInfo xmlns:a="http://schemas.openxmlformats.org/drawingml/2006/main" xmlns:r="http://schemas.openxmlformats.org/officeDocument/2006/relationships" xmlns:ac="http://schemas.microsoft.com/office/drawing/2013/main/command" xmlns:pc="http://schemas.microsoft.com/office/powerpoint/2013/main/command">
   <pc:docChgLst>
     <pc:chgData name="Matheus Nogueira" userId="3ffbdc37af4c2ab0" providerId="LiveId" clId="{684ED9F6-A287-4658-AB68-B81D54743169}"/>
-    <pc:docChg chg="custSel addSld modSld">
-      <pc:chgData name="Matheus Nogueira" userId="3ffbdc37af4c2ab0" providerId="LiveId" clId="{684ED9F6-A287-4658-AB68-B81D54743169}" dt="2021-06-24T01:17:50.599" v="119" actId="14100"/>
+    <pc:docChg chg="custSel addSld modSld sldOrd">
+      <pc:chgData name="Matheus Nogueira" userId="3ffbdc37af4c2ab0" providerId="LiveId" clId="{684ED9F6-A287-4658-AB68-B81D54743169}" dt="2021-06-25T03:24:49.737" v="262" actId="1076"/>
       <pc:docMkLst>
         <pc:docMk/>
       </pc:docMkLst>
@@ -331,6 +338,124 @@
           </ac:picMkLst>
         </pc:picChg>
       </pc:sldChg>
+      <pc:sldChg chg="addSp modSp new mod ord">
+        <pc:chgData name="Matheus Nogueira" userId="3ffbdc37af4c2ab0" providerId="LiveId" clId="{684ED9F6-A287-4658-AB68-B81D54743169}" dt="2021-06-24T13:18:20.847" v="187" actId="1076"/>
+        <pc:sldMkLst>
+          <pc:docMk/>
+          <pc:sldMk cId="1162649569" sldId="262"/>
+        </pc:sldMkLst>
+        <pc:picChg chg="add mod modCrop">
+          <ac:chgData name="Matheus Nogueira" userId="3ffbdc37af4c2ab0" providerId="LiveId" clId="{684ED9F6-A287-4658-AB68-B81D54743169}" dt="2021-06-24T13:17:57.315" v="185" actId="1035"/>
+          <ac:picMkLst>
+            <pc:docMk/>
+            <pc:sldMk cId="1162649569" sldId="262"/>
+            <ac:picMk id="3" creationId="{39F974FE-C370-48FF-8ADA-8D9C157B754A}"/>
+          </ac:picMkLst>
+        </pc:picChg>
+        <pc:picChg chg="add mod modCrop">
+          <ac:chgData name="Matheus Nogueira" userId="3ffbdc37af4c2ab0" providerId="LiveId" clId="{684ED9F6-A287-4658-AB68-B81D54743169}" dt="2021-06-24T13:17:57.315" v="185" actId="1035"/>
+          <ac:picMkLst>
+            <pc:docMk/>
+            <pc:sldMk cId="1162649569" sldId="262"/>
+            <ac:picMk id="5" creationId="{AFE3F87C-8A4C-4FA5-A589-DF21B87288EF}"/>
+          </ac:picMkLst>
+        </pc:picChg>
+        <pc:picChg chg="add mod modCrop">
+          <ac:chgData name="Matheus Nogueira" userId="3ffbdc37af4c2ab0" providerId="LiveId" clId="{684ED9F6-A287-4658-AB68-B81D54743169}" dt="2021-06-24T13:17:57.315" v="185" actId="1035"/>
+          <ac:picMkLst>
+            <pc:docMk/>
+            <pc:sldMk cId="1162649569" sldId="262"/>
+            <ac:picMk id="7" creationId="{7DBF01E4-994A-4ABA-9E19-D834FD8A1152}"/>
+          </ac:picMkLst>
+        </pc:picChg>
+        <pc:picChg chg="add mod modCrop">
+          <ac:chgData name="Matheus Nogueira" userId="3ffbdc37af4c2ab0" providerId="LiveId" clId="{684ED9F6-A287-4658-AB68-B81D54743169}" dt="2021-06-24T13:17:57.315" v="185" actId="1035"/>
+          <ac:picMkLst>
+            <pc:docMk/>
+            <pc:sldMk cId="1162649569" sldId="262"/>
+            <ac:picMk id="9" creationId="{DC974828-57CD-4645-8D0F-E09DC042CEA5}"/>
+          </ac:picMkLst>
+        </pc:picChg>
+        <pc:picChg chg="add mod">
+          <ac:chgData name="Matheus Nogueira" userId="3ffbdc37af4c2ab0" providerId="LiveId" clId="{684ED9F6-A287-4658-AB68-B81D54743169}" dt="2021-06-24T13:18:20.847" v="187" actId="1076"/>
+          <ac:picMkLst>
+            <pc:docMk/>
+            <pc:sldMk cId="1162649569" sldId="262"/>
+            <ac:picMk id="11" creationId="{A75120FA-A5B6-4F89-BC94-5F7C263649CB}"/>
+          </ac:picMkLst>
+        </pc:picChg>
+      </pc:sldChg>
+      <pc:sldChg chg="addSp delSp modSp new mod">
+        <pc:chgData name="Matheus Nogueira" userId="3ffbdc37af4c2ab0" providerId="LiveId" clId="{684ED9F6-A287-4658-AB68-B81D54743169}" dt="2021-06-25T03:24:49.737" v="262" actId="1076"/>
+        <pc:sldMkLst>
+          <pc:docMk/>
+          <pc:sldMk cId="2424376067" sldId="263"/>
+        </pc:sldMkLst>
+        <pc:picChg chg="add mod modCrop">
+          <ac:chgData name="Matheus Nogueira" userId="3ffbdc37af4c2ab0" providerId="LiveId" clId="{684ED9F6-A287-4658-AB68-B81D54743169}" dt="2021-06-25T03:13:20.138" v="237" actId="1076"/>
+          <ac:picMkLst>
+            <pc:docMk/>
+            <pc:sldMk cId="2424376067" sldId="263"/>
+            <ac:picMk id="3" creationId="{111878E4-D7BF-40D3-9220-738D9C05D546}"/>
+          </ac:picMkLst>
+        </pc:picChg>
+        <pc:picChg chg="add del mod">
+          <ac:chgData name="Matheus Nogueira" userId="3ffbdc37af4c2ab0" providerId="LiveId" clId="{684ED9F6-A287-4658-AB68-B81D54743169}" dt="2021-06-24T13:25:40.604" v="229" actId="478"/>
+          <ac:picMkLst>
+            <pc:docMk/>
+            <pc:sldMk cId="2424376067" sldId="263"/>
+            <ac:picMk id="3" creationId="{ACC33FED-B8F2-4E49-9655-5FC45815E7E9}"/>
+          </ac:picMkLst>
+        </pc:picChg>
+        <pc:picChg chg="add del mod">
+          <ac:chgData name="Matheus Nogueira" userId="3ffbdc37af4c2ab0" providerId="LiveId" clId="{684ED9F6-A287-4658-AB68-B81D54743169}" dt="2021-06-24T13:25:40.604" v="229" actId="478"/>
+          <ac:picMkLst>
+            <pc:docMk/>
+            <pc:sldMk cId="2424376067" sldId="263"/>
+            <ac:picMk id="5" creationId="{9002EAE9-82FD-4E9A-95AB-59B692293047}"/>
+          </ac:picMkLst>
+        </pc:picChg>
+        <pc:picChg chg="add mod">
+          <ac:chgData name="Matheus Nogueira" userId="3ffbdc37af4c2ab0" providerId="LiveId" clId="{684ED9F6-A287-4658-AB68-B81D54743169}" dt="2021-06-25T03:13:42.238" v="240" actId="1076"/>
+          <ac:picMkLst>
+            <pc:docMk/>
+            <pc:sldMk cId="2424376067" sldId="263"/>
+            <ac:picMk id="5" creationId="{DE0F9A30-6A4B-44B7-A04D-7027D90537FC}"/>
+          </ac:picMkLst>
+        </pc:picChg>
+        <pc:picChg chg="add del mod">
+          <ac:chgData name="Matheus Nogueira" userId="3ffbdc37af4c2ab0" providerId="LiveId" clId="{684ED9F6-A287-4658-AB68-B81D54743169}" dt="2021-06-24T13:25:40.604" v="229" actId="478"/>
+          <ac:picMkLst>
+            <pc:docMk/>
+            <pc:sldMk cId="2424376067" sldId="263"/>
+            <ac:picMk id="7" creationId="{791A841B-84DE-4174-8B30-37F5A77541B4}"/>
+          </ac:picMkLst>
+        </pc:picChg>
+        <pc:picChg chg="add del mod">
+          <ac:chgData name="Matheus Nogueira" userId="3ffbdc37af4c2ab0" providerId="LiveId" clId="{684ED9F6-A287-4658-AB68-B81D54743169}" dt="2021-06-24T13:25:38.576" v="228" actId="478"/>
+          <ac:picMkLst>
+            <pc:docMk/>
+            <pc:sldMk cId="2424376067" sldId="263"/>
+            <ac:picMk id="9" creationId="{ADC95DC1-1993-42A4-B8C3-BAB83C42EE3C}"/>
+          </ac:picMkLst>
+        </pc:picChg>
+        <pc:cxnChg chg="add mod">
+          <ac:chgData name="Matheus Nogueira" userId="3ffbdc37af4c2ab0" providerId="LiveId" clId="{684ED9F6-A287-4658-AB68-B81D54743169}" dt="2021-06-25T03:24:46.407" v="261" actId="1076"/>
+          <ac:cxnSpMkLst>
+            <pc:docMk/>
+            <pc:sldMk cId="2424376067" sldId="263"/>
+            <ac:cxnSpMk id="7" creationId="{0849C436-A936-4BA1-A37F-F95579C6C9CC}"/>
+          </ac:cxnSpMkLst>
+        </pc:cxnChg>
+        <pc:cxnChg chg="add mod">
+          <ac:chgData name="Matheus Nogueira" userId="3ffbdc37af4c2ab0" providerId="LiveId" clId="{684ED9F6-A287-4658-AB68-B81D54743169}" dt="2021-06-25T03:24:49.737" v="262" actId="1076"/>
+          <ac:cxnSpMkLst>
+            <pc:docMk/>
+            <pc:sldMk cId="2424376067" sldId="263"/>
+            <ac:cxnSpMk id="8" creationId="{62E03458-7943-4644-8041-3920BA3DB4C0}"/>
+          </ac:cxnSpMkLst>
+        </pc:cxnChg>
+      </pc:sldChg>
     </pc:docChg>
   </pc:docChgLst>
 </pc:chgInfo>
@@ -483,7 +608,7 @@
           <a:p>
             <a:fld id="{A33C47A9-98B5-4B9D-A7A6-882F11B04EC6}" type="datetimeFigureOut">
               <a:rPr lang="pt-BR" smtClean="0"/>
-              <a:t>23/06/2021</a:t>
+              <a:t>25/06/2021</a:t>
             </a:fld>
             <a:endParaRPr lang="pt-BR"/>
           </a:p>
@@ -681,7 +806,7 @@
           <a:p>
             <a:fld id="{A33C47A9-98B5-4B9D-A7A6-882F11B04EC6}" type="datetimeFigureOut">
               <a:rPr lang="pt-BR" smtClean="0"/>
-              <a:t>23/06/2021</a:t>
+              <a:t>25/06/2021</a:t>
             </a:fld>
             <a:endParaRPr lang="pt-BR"/>
           </a:p>
@@ -889,7 +1014,7 @@
           <a:p>
             <a:fld id="{A33C47A9-98B5-4B9D-A7A6-882F11B04EC6}" type="datetimeFigureOut">
               <a:rPr lang="pt-BR" smtClean="0"/>
-              <a:t>23/06/2021</a:t>
+              <a:t>25/06/2021</a:t>
             </a:fld>
             <a:endParaRPr lang="pt-BR"/>
           </a:p>
@@ -1087,7 +1212,7 @@
           <a:p>
             <a:fld id="{A33C47A9-98B5-4B9D-A7A6-882F11B04EC6}" type="datetimeFigureOut">
               <a:rPr lang="pt-BR" smtClean="0"/>
-              <a:t>23/06/2021</a:t>
+              <a:t>25/06/2021</a:t>
             </a:fld>
             <a:endParaRPr lang="pt-BR"/>
           </a:p>
@@ -1362,7 +1487,7 @@
           <a:p>
             <a:fld id="{A33C47A9-98B5-4B9D-A7A6-882F11B04EC6}" type="datetimeFigureOut">
               <a:rPr lang="pt-BR" smtClean="0"/>
-              <a:t>23/06/2021</a:t>
+              <a:t>25/06/2021</a:t>
             </a:fld>
             <a:endParaRPr lang="pt-BR"/>
           </a:p>
@@ -1627,7 +1752,7 @@
           <a:p>
             <a:fld id="{A33C47A9-98B5-4B9D-A7A6-882F11B04EC6}" type="datetimeFigureOut">
               <a:rPr lang="pt-BR" smtClean="0"/>
-              <a:t>23/06/2021</a:t>
+              <a:t>25/06/2021</a:t>
             </a:fld>
             <a:endParaRPr lang="pt-BR"/>
           </a:p>
@@ -2039,7 +2164,7 @@
           <a:p>
             <a:fld id="{A33C47A9-98B5-4B9D-A7A6-882F11B04EC6}" type="datetimeFigureOut">
               <a:rPr lang="pt-BR" smtClean="0"/>
-              <a:t>23/06/2021</a:t>
+              <a:t>25/06/2021</a:t>
             </a:fld>
             <a:endParaRPr lang="pt-BR"/>
           </a:p>
@@ -2180,7 +2305,7 @@
           <a:p>
             <a:fld id="{A33C47A9-98B5-4B9D-A7A6-882F11B04EC6}" type="datetimeFigureOut">
               <a:rPr lang="pt-BR" smtClean="0"/>
-              <a:t>23/06/2021</a:t>
+              <a:t>25/06/2021</a:t>
             </a:fld>
             <a:endParaRPr lang="pt-BR"/>
           </a:p>
@@ -2293,7 +2418,7 @@
           <a:p>
             <a:fld id="{A33C47A9-98B5-4B9D-A7A6-882F11B04EC6}" type="datetimeFigureOut">
               <a:rPr lang="pt-BR" smtClean="0"/>
-              <a:t>23/06/2021</a:t>
+              <a:t>25/06/2021</a:t>
             </a:fld>
             <a:endParaRPr lang="pt-BR"/>
           </a:p>
@@ -2604,7 +2729,7 @@
           <a:p>
             <a:fld id="{A33C47A9-98B5-4B9D-A7A6-882F11B04EC6}" type="datetimeFigureOut">
               <a:rPr lang="pt-BR" smtClean="0"/>
-              <a:t>23/06/2021</a:t>
+              <a:t>25/06/2021</a:t>
             </a:fld>
             <a:endParaRPr lang="pt-BR"/>
           </a:p>
@@ -2892,7 +3017,7 @@
           <a:p>
             <a:fld id="{A33C47A9-98B5-4B9D-A7A6-882F11B04EC6}" type="datetimeFigureOut">
               <a:rPr lang="pt-BR" smtClean="0"/>
-              <a:t>23/06/2021</a:t>
+              <a:t>25/06/2021</a:t>
             </a:fld>
             <a:endParaRPr lang="pt-BR"/>
           </a:p>
@@ -3133,7 +3258,7 @@
           <a:p>
             <a:fld id="{A33C47A9-98B5-4B9D-A7A6-882F11B04EC6}" type="datetimeFigureOut">
               <a:rPr lang="pt-BR" smtClean="0"/>
-              <a:t>23/06/2021</a:t>
+              <a:t>25/06/2021</a:t>
             </a:fld>
             <a:endParaRPr lang="pt-BR"/>
           </a:p>
@@ -4308,6 +4433,353 @@
 </p:sld>
 </file>
 
+<file path=ppt/slides/slide7.xml><?xml version="1.0" encoding="utf-8"?>
+<p:sld xmlns:a="http://schemas.openxmlformats.org/drawingml/2006/main" xmlns:r="http://schemas.openxmlformats.org/officeDocument/2006/relationships" xmlns:p="http://schemas.openxmlformats.org/presentationml/2006/main">
+  <p:cSld>
+    <p:spTree>
+      <p:nvGrpSpPr>
+        <p:cNvPr id="1" name=""/>
+        <p:cNvGrpSpPr/>
+        <p:nvPr/>
+      </p:nvGrpSpPr>
+      <p:grpSpPr>
+        <a:xfrm>
+          <a:off x="0" y="0"/>
+          <a:ext cx="0" cy="0"/>
+          <a:chOff x="0" y="0"/>
+          <a:chExt cx="0" cy="0"/>
+        </a:xfrm>
+      </p:grpSpPr>
+      <p:pic>
+        <p:nvPicPr>
+          <p:cNvPr id="3" name="Imagem 2">
+            <a:extLst>
+              <a:ext uri="{FF2B5EF4-FFF2-40B4-BE49-F238E27FC236}">
+                <a16:creationId xmlns:a16="http://schemas.microsoft.com/office/drawing/2014/main" id="{39F974FE-C370-48FF-8ADA-8D9C157B754A}"/>
+              </a:ext>
+            </a:extLst>
+          </p:cNvPr>
+          <p:cNvPicPr>
+            <a:picLocks noChangeAspect="1"/>
+          </p:cNvPicPr>
+          <p:nvPr/>
+        </p:nvPicPr>
+        <p:blipFill rotWithShape="1">
+          <a:blip r:embed="rId2"/>
+          <a:srcRect l="30390" t="28815" r="23281" b="32518"/>
+          <a:stretch/>
+        </p:blipFill>
+        <p:spPr>
+          <a:xfrm>
+            <a:off x="447674" y="85725"/>
+            <a:ext cx="5648326" cy="2486025"/>
+          </a:xfrm>
+          <a:prstGeom prst="rect">
+            <a:avLst/>
+          </a:prstGeom>
+        </p:spPr>
+      </p:pic>
+      <p:pic>
+        <p:nvPicPr>
+          <p:cNvPr id="5" name="Imagem 4">
+            <a:extLst>
+              <a:ext uri="{FF2B5EF4-FFF2-40B4-BE49-F238E27FC236}">
+                <a16:creationId xmlns:a16="http://schemas.microsoft.com/office/drawing/2014/main" id="{AFE3F87C-8A4C-4FA5-A589-DF21B87288EF}"/>
+              </a:ext>
+            </a:extLst>
+          </p:cNvPr>
+          <p:cNvPicPr>
+            <a:picLocks noChangeAspect="1"/>
+          </p:cNvPicPr>
+          <p:nvPr/>
+        </p:nvPicPr>
+        <p:blipFill rotWithShape="1">
+          <a:blip r:embed="rId3"/>
+          <a:srcRect l="32187" t="31186" r="21485" b="28518"/>
+          <a:stretch/>
+        </p:blipFill>
+        <p:spPr>
+          <a:xfrm>
+            <a:off x="6096000" y="85725"/>
+            <a:ext cx="5410200" cy="2481575"/>
+          </a:xfrm>
+          <a:prstGeom prst="rect">
+            <a:avLst/>
+          </a:prstGeom>
+        </p:spPr>
+      </p:pic>
+      <p:pic>
+        <p:nvPicPr>
+          <p:cNvPr id="7" name="Imagem 6">
+            <a:extLst>
+              <a:ext uri="{FF2B5EF4-FFF2-40B4-BE49-F238E27FC236}">
+                <a16:creationId xmlns:a16="http://schemas.microsoft.com/office/drawing/2014/main" id="{7DBF01E4-994A-4ABA-9E19-D834FD8A1152}"/>
+              </a:ext>
+            </a:extLst>
+          </p:cNvPr>
+          <p:cNvPicPr>
+            <a:picLocks noChangeAspect="1"/>
+          </p:cNvPicPr>
+          <p:nvPr/>
+        </p:nvPicPr>
+        <p:blipFill rotWithShape="1">
+          <a:blip r:embed="rId4"/>
+          <a:srcRect l="33984" t="35185" r="19688" b="26217"/>
+          <a:stretch/>
+        </p:blipFill>
+        <p:spPr>
+          <a:xfrm>
+            <a:off x="447674" y="2567300"/>
+            <a:ext cx="5648326" cy="2481575"/>
+          </a:xfrm>
+          <a:prstGeom prst="rect">
+            <a:avLst/>
+          </a:prstGeom>
+        </p:spPr>
+      </p:pic>
+      <p:pic>
+        <p:nvPicPr>
+          <p:cNvPr id="9" name="Imagem 8">
+            <a:extLst>
+              <a:ext uri="{FF2B5EF4-FFF2-40B4-BE49-F238E27FC236}">
+                <a16:creationId xmlns:a16="http://schemas.microsoft.com/office/drawing/2014/main" id="{DC974828-57CD-4645-8D0F-E09DC042CEA5}"/>
+              </a:ext>
+            </a:extLst>
+          </p:cNvPr>
+          <p:cNvPicPr>
+            <a:picLocks noChangeAspect="1"/>
+          </p:cNvPicPr>
+          <p:nvPr/>
+        </p:nvPicPr>
+        <p:blipFill rotWithShape="1">
+          <a:blip r:embed="rId5"/>
+          <a:srcRect l="35781" t="38445" r="17890" b="21704"/>
+          <a:stretch/>
+        </p:blipFill>
+        <p:spPr>
+          <a:xfrm>
+            <a:off x="6096000" y="2567300"/>
+            <a:ext cx="5410200" cy="2454206"/>
+          </a:xfrm>
+          <a:prstGeom prst="rect">
+            <a:avLst/>
+          </a:prstGeom>
+        </p:spPr>
+      </p:pic>
+      <p:pic>
+        <p:nvPicPr>
+          <p:cNvPr id="11" name="Imagem 10">
+            <a:extLst>
+              <a:ext uri="{FF2B5EF4-FFF2-40B4-BE49-F238E27FC236}">
+                <a16:creationId xmlns:a16="http://schemas.microsoft.com/office/drawing/2014/main" id="{A75120FA-A5B6-4F89-BC94-5F7C263649CB}"/>
+              </a:ext>
+            </a:extLst>
+          </p:cNvPr>
+          <p:cNvPicPr>
+            <a:picLocks noChangeAspect="1"/>
+          </p:cNvPicPr>
+          <p:nvPr/>
+        </p:nvPicPr>
+        <p:blipFill>
+          <a:blip r:embed="rId6"/>
+          <a:stretch>
+            <a:fillRect/>
+          </a:stretch>
+        </p:blipFill>
+        <p:spPr>
+          <a:xfrm>
+            <a:off x="2847537" y="5021506"/>
+            <a:ext cx="6268325" cy="2867425"/>
+          </a:xfrm>
+          <a:prstGeom prst="rect">
+            <a:avLst/>
+          </a:prstGeom>
+        </p:spPr>
+      </p:pic>
+    </p:spTree>
+    <p:extLst>
+      <p:ext uri="{BB962C8B-B14F-4D97-AF65-F5344CB8AC3E}">
+        <p14:creationId xmlns:p14="http://schemas.microsoft.com/office/powerpoint/2010/main" val="1162649569"/>
+      </p:ext>
+    </p:extLst>
+  </p:cSld>
+  <p:clrMapOvr>
+    <a:masterClrMapping/>
+  </p:clrMapOvr>
+</p:sld>
+</file>
+
+<file path=ppt/slides/slide8.xml><?xml version="1.0" encoding="utf-8"?>
+<p:sld xmlns:a="http://schemas.openxmlformats.org/drawingml/2006/main" xmlns:r="http://schemas.openxmlformats.org/officeDocument/2006/relationships" xmlns:p="http://schemas.openxmlformats.org/presentationml/2006/main">
+  <p:cSld>
+    <p:spTree>
+      <p:nvGrpSpPr>
+        <p:cNvPr id="1" name=""/>
+        <p:cNvGrpSpPr/>
+        <p:nvPr/>
+      </p:nvGrpSpPr>
+      <p:grpSpPr>
+        <a:xfrm>
+          <a:off x="0" y="0"/>
+          <a:ext cx="0" cy="0"/>
+          <a:chOff x="0" y="0"/>
+          <a:chExt cx="0" cy="0"/>
+        </a:xfrm>
+      </p:grpSpPr>
+      <p:pic>
+        <p:nvPicPr>
+          <p:cNvPr id="3" name="Imagem 2" descr="Interface gráfica do usuário&#10;&#10;Descrição gerada automaticamente">
+            <a:extLst>
+              <a:ext uri="{FF2B5EF4-FFF2-40B4-BE49-F238E27FC236}">
+                <a16:creationId xmlns:a16="http://schemas.microsoft.com/office/drawing/2014/main" id="{111878E4-D7BF-40D3-9220-738D9C05D546}"/>
+              </a:ext>
+            </a:extLst>
+          </p:cNvPr>
+          <p:cNvPicPr>
+            <a:picLocks noChangeAspect="1"/>
+          </p:cNvPicPr>
+          <p:nvPr/>
+        </p:nvPicPr>
+        <p:blipFill rotWithShape="1">
+          <a:blip r:embed="rId2">
+            <a:extLst>
+              <a:ext uri="{28A0092B-C50C-407E-A947-70E740481C1C}">
+                <a14:useLocalDpi xmlns:a14="http://schemas.microsoft.com/office/drawing/2010/main" val="0"/>
+              </a:ext>
+            </a:extLst>
+          </a:blip>
+          <a:srcRect l="46113" t="33305" r="4843" b="40130"/>
+          <a:stretch/>
+        </p:blipFill>
+        <p:spPr>
+          <a:xfrm>
+            <a:off x="335560" y="587227"/>
+            <a:ext cx="7988076" cy="3212985"/>
+          </a:xfrm>
+          <a:prstGeom prst="rect">
+            <a:avLst/>
+          </a:prstGeom>
+        </p:spPr>
+      </p:pic>
+      <p:pic>
+        <p:nvPicPr>
+          <p:cNvPr id="5" name="Imagem 4">
+            <a:extLst>
+              <a:ext uri="{FF2B5EF4-FFF2-40B4-BE49-F238E27FC236}">
+                <a16:creationId xmlns:a16="http://schemas.microsoft.com/office/drawing/2014/main" id="{DE0F9A30-6A4B-44B7-A04D-7027D90537FC}"/>
+              </a:ext>
+            </a:extLst>
+          </p:cNvPr>
+          <p:cNvPicPr>
+            <a:picLocks noChangeAspect="1"/>
+          </p:cNvPicPr>
+          <p:nvPr/>
+        </p:nvPicPr>
+        <p:blipFill>
+          <a:blip r:embed="rId3"/>
+          <a:stretch>
+            <a:fillRect/>
+          </a:stretch>
+        </p:blipFill>
+        <p:spPr>
+          <a:xfrm>
+            <a:off x="8511183" y="691891"/>
+            <a:ext cx="1605940" cy="3997005"/>
+          </a:xfrm>
+          <a:prstGeom prst="rect">
+            <a:avLst/>
+          </a:prstGeom>
+        </p:spPr>
+      </p:pic>
+      <p:cxnSp>
+        <p:nvCxnSpPr>
+          <p:cNvPr id="7" name="Conector reto 6">
+            <a:extLst>
+              <a:ext uri="{FF2B5EF4-FFF2-40B4-BE49-F238E27FC236}">
+                <a16:creationId xmlns:a16="http://schemas.microsoft.com/office/drawing/2014/main" id="{0849C436-A936-4BA1-A37F-F95579C6C9CC}"/>
+              </a:ext>
+            </a:extLst>
+          </p:cNvPr>
+          <p:cNvCxnSpPr/>
+          <p:nvPr/>
+        </p:nvCxnSpPr>
+        <p:spPr>
+          <a:xfrm>
+            <a:off x="4144161" y="1449198"/>
+            <a:ext cx="0" cy="1979802"/>
+          </a:xfrm>
+          <a:prstGeom prst="line">
+            <a:avLst/>
+          </a:prstGeom>
+          <a:ln w="19050"/>
+        </p:spPr>
+        <p:style>
+          <a:lnRef idx="1">
+            <a:schemeClr val="accent1"/>
+          </a:lnRef>
+          <a:fillRef idx="0">
+            <a:schemeClr val="accent1"/>
+          </a:fillRef>
+          <a:effectRef idx="0">
+            <a:schemeClr val="accent1"/>
+          </a:effectRef>
+          <a:fontRef idx="minor">
+            <a:schemeClr val="tx1"/>
+          </a:fontRef>
+        </p:style>
+      </p:cxnSp>
+      <p:cxnSp>
+        <p:nvCxnSpPr>
+          <p:cNvPr id="8" name="Conector reto 7">
+            <a:extLst>
+              <a:ext uri="{FF2B5EF4-FFF2-40B4-BE49-F238E27FC236}">
+                <a16:creationId xmlns:a16="http://schemas.microsoft.com/office/drawing/2014/main" id="{62E03458-7943-4644-8041-3920BA3DB4C0}"/>
+              </a:ext>
+            </a:extLst>
+          </p:cNvPr>
+          <p:cNvCxnSpPr>
+            <a:cxnSpLocks/>
+          </p:cNvCxnSpPr>
+          <p:nvPr/>
+        </p:nvCxnSpPr>
+        <p:spPr>
+          <a:xfrm flipH="1">
+            <a:off x="335560" y="3050421"/>
+            <a:ext cx="6432958" cy="0"/>
+          </a:xfrm>
+          <a:prstGeom prst="line">
+            <a:avLst/>
+          </a:prstGeom>
+          <a:ln w="19050"/>
+        </p:spPr>
+        <p:style>
+          <a:lnRef idx="1">
+            <a:schemeClr val="accent1"/>
+          </a:lnRef>
+          <a:fillRef idx="0">
+            <a:schemeClr val="accent1"/>
+          </a:fillRef>
+          <a:effectRef idx="0">
+            <a:schemeClr val="accent1"/>
+          </a:effectRef>
+          <a:fontRef idx="minor">
+            <a:schemeClr val="tx1"/>
+          </a:fontRef>
+        </p:style>
+      </p:cxnSp>
+    </p:spTree>
+    <p:extLst>
+      <p:ext uri="{BB962C8B-B14F-4D97-AF65-F5344CB8AC3E}">
+        <p14:creationId xmlns:p14="http://schemas.microsoft.com/office/powerpoint/2010/main" val="2424376067"/>
+      </p:ext>
+    </p:extLst>
+  </p:cSld>
+  <p:clrMapOvr>
+    <a:masterClrMapping/>
+  </p:clrMapOvr>
+</p:sld>
+</file>
+
 <file path=ppt/theme/theme1.xml><?xml version="1.0" encoding="utf-8"?>
 <a:theme xmlns:a="http://schemas.openxmlformats.org/drawingml/2006/main" name="Tema do Office">
   <a:themeElements>

</xml_diff>